<commit_message>
Update ITD_04_Placing 3D Objects AR.pptx
</commit_message>
<xml_diff>
--- a/Modules/ITD/Week 2/Slides/ITD_04_Placing 3D Objects AR.pptx
+++ b/Modules/ITD/Week 2/Slides/ITD_04_Placing 3D Objects AR.pptx
@@ -212,7 +212,7 @@
           <a:p>
             <a:fld id="{1C633808-4D66-4A18-AEB5-16F5EA9B7D51}" type="datetimeFigureOut">
               <a:rPr lang="en-US" smtClean="0"/>
-              <a:t>10/26/2021</a:t>
+              <a:t>10/27/2021</a:t>
             </a:fld>
             <a:endParaRPr lang="en-US"/>
           </a:p>
@@ -626,7 +626,7 @@
           <a:p>
             <a:fld id="{6C36B2C3-558B-48FB-A029-22CFB7392BA1}" type="datetimeFigureOut">
               <a:rPr lang="en-US" smtClean="0"/>
-              <a:t>10/26/2021</a:t>
+              <a:t>10/27/2021</a:t>
             </a:fld>
             <a:endParaRPr lang="en-US"/>
           </a:p>
@@ -824,7 +824,7 @@
           <a:p>
             <a:fld id="{6C36B2C3-558B-48FB-A029-22CFB7392BA1}" type="datetimeFigureOut">
               <a:rPr lang="en-US" smtClean="0"/>
-              <a:t>10/26/2021</a:t>
+              <a:t>10/27/2021</a:t>
             </a:fld>
             <a:endParaRPr lang="en-US"/>
           </a:p>
@@ -1032,7 +1032,7 @@
           <a:p>
             <a:fld id="{6C36B2C3-558B-48FB-A029-22CFB7392BA1}" type="datetimeFigureOut">
               <a:rPr lang="en-US" smtClean="0"/>
-              <a:t>10/26/2021</a:t>
+              <a:t>10/27/2021</a:t>
             </a:fld>
             <a:endParaRPr lang="en-US"/>
           </a:p>
@@ -1230,7 +1230,7 @@
           <a:p>
             <a:fld id="{6C36B2C3-558B-48FB-A029-22CFB7392BA1}" type="datetimeFigureOut">
               <a:rPr lang="en-US" smtClean="0"/>
-              <a:t>10/26/2021</a:t>
+              <a:t>10/27/2021</a:t>
             </a:fld>
             <a:endParaRPr lang="en-US" dirty="0"/>
           </a:p>
@@ -1697,7 +1697,7 @@
           <a:p>
             <a:fld id="{6C36B2C3-558B-48FB-A029-22CFB7392BA1}" type="datetimeFigureOut">
               <a:rPr lang="en-US" smtClean="0"/>
-              <a:t>10/26/2021</a:t>
+              <a:t>10/27/2021</a:t>
             </a:fld>
             <a:endParaRPr lang="en-US"/>
           </a:p>
@@ -1962,7 +1962,7 @@
           <a:p>
             <a:fld id="{6C36B2C3-558B-48FB-A029-22CFB7392BA1}" type="datetimeFigureOut">
               <a:rPr lang="en-US" smtClean="0"/>
-              <a:t>10/26/2021</a:t>
+              <a:t>10/27/2021</a:t>
             </a:fld>
             <a:endParaRPr lang="en-US"/>
           </a:p>
@@ -2374,7 +2374,7 @@
           <a:p>
             <a:fld id="{6C36B2C3-558B-48FB-A029-22CFB7392BA1}" type="datetimeFigureOut">
               <a:rPr lang="en-US" smtClean="0"/>
-              <a:t>10/26/2021</a:t>
+              <a:t>10/27/2021</a:t>
             </a:fld>
             <a:endParaRPr lang="en-US"/>
           </a:p>
@@ -2515,7 +2515,7 @@
           <a:p>
             <a:fld id="{6C36B2C3-558B-48FB-A029-22CFB7392BA1}" type="datetimeFigureOut">
               <a:rPr lang="en-US" smtClean="0"/>
-              <a:t>10/26/2021</a:t>
+              <a:t>10/27/2021</a:t>
             </a:fld>
             <a:endParaRPr lang="en-US"/>
           </a:p>
@@ -2628,7 +2628,7 @@
           <a:p>
             <a:fld id="{6C36B2C3-558B-48FB-A029-22CFB7392BA1}" type="datetimeFigureOut">
               <a:rPr lang="en-US" smtClean="0"/>
-              <a:t>10/26/2021</a:t>
+              <a:t>10/27/2021</a:t>
             </a:fld>
             <a:endParaRPr lang="en-US"/>
           </a:p>
@@ -2939,7 +2939,7 @@
           <a:p>
             <a:fld id="{6C36B2C3-558B-48FB-A029-22CFB7392BA1}" type="datetimeFigureOut">
               <a:rPr lang="en-US" smtClean="0"/>
-              <a:t>10/26/2021</a:t>
+              <a:t>10/27/2021</a:t>
             </a:fld>
             <a:endParaRPr lang="en-US"/>
           </a:p>
@@ -3230,7 +3230,7 @@
           <a:p>
             <a:fld id="{6C36B2C3-558B-48FB-A029-22CFB7392BA1}" type="datetimeFigureOut">
               <a:rPr lang="en-US" smtClean="0"/>
-              <a:t>10/26/2021</a:t>
+              <a:t>10/27/2021</a:t>
             </a:fld>
             <a:endParaRPr lang="en-US"/>
           </a:p>
@@ -3471,7 +3471,7 @@
           <a:p>
             <a:fld id="{6C36B2C3-558B-48FB-A029-22CFB7392BA1}" type="datetimeFigureOut">
               <a:rPr lang="en-US" smtClean="0"/>
-              <a:t>10/26/2021</a:t>
+              <a:t>10/27/2021</a:t>
             </a:fld>
             <a:endParaRPr lang="en-US"/>
           </a:p>
@@ -4503,7 +4503,19 @@
               <a:rPr lang="en-US" sz="2400" dirty="0">
                 <a:latin typeface="Bahnschrift" panose="020B0502040204020203" pitchFamily="34" charset="0"/>
               </a:rPr>
-              <a:t>Once a Ground Plane Stage object has been created, you should see a 3d axis with ‘100cm’ markings at each axis appear in your scene.</a:t>
+              <a:t>Once a </a:t>
+            </a:r>
+            <a:r>
+              <a:rPr lang="en-US" sz="2400">
+                <a:latin typeface="Bahnschrift" panose="020B0502040204020203" pitchFamily="34" charset="0"/>
+              </a:rPr>
+              <a:t>Mid Air Stage </a:t>
+            </a:r>
+            <a:r>
+              <a:rPr lang="en-US" sz="2400" dirty="0">
+                <a:latin typeface="Bahnschrift" panose="020B0502040204020203" pitchFamily="34" charset="0"/>
+              </a:rPr>
+              <a:t>object has been created, you should see a 3d axis with ‘100cm’ markings at each axis appear in your scene.</a:t>
             </a:r>
           </a:p>
           <a:p>

</xml_diff>